<commit_message>
Presentación a pares.pptx (1era parte)
</commit_message>
<xml_diff>
--- a/se/Trabajo Profesional/Presentación a pares.pptx
+++ b/se/Trabajo Profesional/Presentación a pares.pptx
@@ -5,14 +5,20 @@
     <p:sldMasterId id="2147483648" r:id="rId2"/>
   </p:sldMasterIdLst>
   <p:notesMasterIdLst>
-    <p:notesMasterId r:id="rId5"/>
+    <p:notesMasterId r:id="rId11"/>
   </p:notesMasterIdLst>
   <p:handoutMasterIdLst>
-    <p:handoutMasterId r:id="rId6"/>
+    <p:handoutMasterId r:id="rId12"/>
   </p:handoutMasterIdLst>
   <p:sldIdLst>
     <p:sldId id="256" r:id="rId3"/>
     <p:sldId id="257" r:id="rId4"/>
+    <p:sldId id="258" r:id="rId5"/>
+    <p:sldId id="259" r:id="rId6"/>
+    <p:sldId id="260" r:id="rId7"/>
+    <p:sldId id="261" r:id="rId8"/>
+    <p:sldId id="262" r:id="rId9"/>
+    <p:sldId id="263" r:id="rId10"/>
   </p:sldIdLst>
   <p:sldSz cx="9144000" cy="6858000" type="screen4x3"/>
   <p:notesSz cx="6858000" cy="9144000"/>
@@ -192,7 +198,7 @@
             <a:fld id="{A849C5AD-4428-4E9C-9C84-11B72C9365FB}" type="datetimeFigureOut">
               <a:rPr lang="es-ES" smtClean="0"/>
               <a:pPr/>
-              <a:t>28/05/2012</a:t>
+              <a:t>29/05/2012</a:t>
             </a:fld>
             <a:endParaRPr lang="es-ES" dirty="0" smtClean="0"/>
           </a:p>
@@ -2540,22 +2546,13 @@
               <a:buAutoNum type="arabicPeriod"/>
             </a:pPr>
             <a:r>
-              <a:rPr lang="es-ES" sz="2600" dirty="0" smtClean="0">
-                <a:solidFill>
-                  <a:schemeClr val="tx1"/>
-                </a:solidFill>
-                <a:cs typeface="Arial" charset="0"/>
-              </a:rPr>
-              <a:t>¿</a:t>
-            </a:r>
-            <a:r>
               <a:rPr lang="es-ES" sz="2600" dirty="0">
                 <a:solidFill>
                   <a:schemeClr val="tx1"/>
                 </a:solidFill>
                 <a:cs typeface="Arial" charset="0"/>
               </a:rPr>
-              <a:t>Quienes Somos? </a:t>
+              <a:t>¿Quienes Somos? </a:t>
             </a:r>
           </a:p>
           <a:p>
@@ -2579,22 +2576,13 @@
               <a:buAutoNum type="arabicPeriod"/>
             </a:pPr>
             <a:r>
-              <a:rPr lang="es-ES" sz="2600" dirty="0" smtClean="0">
-                <a:solidFill>
-                  <a:schemeClr val="tx1"/>
-                </a:solidFill>
-                <a:cs typeface="Arial" charset="0"/>
-              </a:rPr>
-              <a:t>Introducción </a:t>
-            </a:r>
-            <a:r>
               <a:rPr lang="es-ES" sz="2600" dirty="0">
                 <a:solidFill>
                   <a:schemeClr val="tx1"/>
                 </a:solidFill>
                 <a:cs typeface="Arial" charset="0"/>
               </a:rPr>
-              <a:t>al cliente</a:t>
+              <a:t>Nuestro cliente</a:t>
             </a:r>
           </a:p>
           <a:p>
@@ -2602,36 +2590,6 @@
               <a:buFont typeface="Trebuchet MS" pitchFamily="34" charset="0"/>
               <a:buAutoNum type="arabicPeriod"/>
             </a:pPr>
-            <a:r>
-              <a:rPr lang="es-ES" sz="2600" dirty="0" smtClean="0">
-                <a:solidFill>
-                  <a:schemeClr val="tx1"/>
-                </a:solidFill>
-                <a:cs typeface="Arial" charset="0"/>
-              </a:rPr>
-              <a:t>Nuestra solución</a:t>
-            </a:r>
-            <a:endParaRPr lang="es-ES" sz="2600" dirty="0">
-              <a:solidFill>
-                <a:schemeClr val="tx1"/>
-              </a:solidFill>
-              <a:cs typeface="Arial" charset="0"/>
-            </a:endParaRPr>
-          </a:p>
-          <a:p>
-            <a:pPr marL="566738" indent="-457200">
-              <a:buFont typeface="Trebuchet MS" pitchFamily="34" charset="0"/>
-              <a:buAutoNum type="arabicPeriod"/>
-            </a:pPr>
-            <a:r>
-              <a:rPr lang="es-ES" sz="2600" dirty="0" smtClean="0">
-                <a:solidFill>
-                  <a:schemeClr val="tx1"/>
-                </a:solidFill>
-                <a:cs typeface="Arial" charset="0"/>
-              </a:rPr>
-              <a:t>Estado </a:t>
-            </a:r>
             <a:r>
               <a:rPr lang="es-ES" sz="2600" dirty="0">
                 <a:solidFill>
@@ -2639,7 +2597,22 @@
                 </a:solidFill>
                 <a:cs typeface="Arial" charset="0"/>
               </a:rPr>
-              <a:t>del proyecto - Logros/Próximos pasos</a:t>
+              <a:t>Nuestra solución</a:t>
+            </a:r>
+          </a:p>
+          <a:p>
+            <a:pPr marL="566738" indent="-457200">
+              <a:buFont typeface="Trebuchet MS" pitchFamily="34" charset="0"/>
+              <a:buAutoNum type="arabicPeriod"/>
+            </a:pPr>
+            <a:r>
+              <a:rPr lang="es-ES" sz="2600" dirty="0">
+                <a:solidFill>
+                  <a:schemeClr val="tx1"/>
+                </a:solidFill>
+                <a:cs typeface="Arial" charset="0"/>
+              </a:rPr>
+              <a:t>Proyecto - Logros/Próximos pasos</a:t>
             </a:r>
           </a:p>
           <a:p>
@@ -2727,6 +2700,1727 @@
     <p:extLst>
       <p:ext uri="{BB962C8B-B14F-4D97-AF65-F5344CB8AC3E}">
         <p14:creationId xmlns:p14="http://schemas.microsoft.com/office/powerpoint/2010/main" val="2624998335"/>
+      </p:ext>
+    </p:extLst>
+  </p:cSld>
+  <p:clrMapOvr>
+    <a:masterClrMapping/>
+  </p:clrMapOvr>
+  <p:timing>
+    <p:tnLst>
+      <p:par>
+        <p:cTn id="1" dur="indefinite" restart="never" nodeType="tmRoot"/>
+      </p:par>
+    </p:tnLst>
+  </p:timing>
+</p:sld>
+</file>
+
+<file path=ppt/slides/slide3.xml><?xml version="1.0" encoding="utf-8"?>
+<p:sld xmlns:a="http://schemas.openxmlformats.org/drawingml/2006/main" xmlns:r="http://schemas.openxmlformats.org/officeDocument/2006/relationships" xmlns:p="http://schemas.openxmlformats.org/presentationml/2006/main">
+  <p:cSld>
+    <p:spTree>
+      <p:nvGrpSpPr>
+        <p:cNvPr id="1" name=""/>
+        <p:cNvGrpSpPr/>
+        <p:nvPr/>
+      </p:nvGrpSpPr>
+      <p:grpSpPr>
+        <a:xfrm>
+          <a:off x="0" y="0"/>
+          <a:ext cx="0" cy="0"/>
+          <a:chOff x="0" y="0"/>
+          <a:chExt cx="0" cy="0"/>
+        </a:xfrm>
+      </p:grpSpPr>
+      <p:sp>
+        <p:nvSpPr>
+          <p:cNvPr id="2" name="1 Marcador de texto"/>
+          <p:cNvSpPr>
+            <a:spLocks noGrp="1"/>
+          </p:cNvSpPr>
+          <p:nvPr>
+            <p:ph type="body" idx="1"/>
+          </p:nvPr>
+        </p:nvSpPr>
+        <p:spPr/>
+        <p:txBody>
+          <a:bodyPr/>
+          <a:lstStyle/>
+          <a:p>
+            <a:pPr marL="566738" indent="-457200">
+              <a:buFont typeface="Trebuchet MS" pitchFamily="34" charset="0"/>
+              <a:buAutoNum type="arabicPeriod"/>
+            </a:pPr>
+            <a:endParaRPr lang="es-ES" dirty="0" smtClean="0">
+              <a:solidFill>
+                <a:schemeClr val="tx1"/>
+              </a:solidFill>
+              <a:cs typeface="Arial" charset="0"/>
+            </a:endParaRPr>
+          </a:p>
+          <a:p>
+            <a:pPr marL="566738" indent="-457200">
+              <a:buFont typeface="Trebuchet MS" pitchFamily="34" charset="0"/>
+              <a:buAutoNum type="arabicPeriod"/>
+            </a:pPr>
+            <a:endParaRPr lang="es-ES" dirty="0">
+              <a:solidFill>
+                <a:schemeClr val="tx1"/>
+              </a:solidFill>
+              <a:cs typeface="Arial" charset="0"/>
+            </a:endParaRPr>
+          </a:p>
+          <a:p>
+            <a:pPr marL="566738" indent="-457200">
+              <a:buFont typeface="Trebuchet MS" pitchFamily="34" charset="0"/>
+              <a:buAutoNum type="arabicPeriod"/>
+            </a:pPr>
+            <a:r>
+              <a:rPr lang="es-ES" sz="2600" b="1" dirty="0">
+                <a:solidFill>
+                  <a:srgbClr val="FF0000"/>
+                </a:solidFill>
+                <a:cs typeface="Arial" charset="0"/>
+              </a:rPr>
+              <a:t>¿Quienes Somos? </a:t>
+            </a:r>
+          </a:p>
+          <a:p>
+            <a:pPr marL="566738" indent="-457200">
+              <a:buFont typeface="Trebuchet MS" pitchFamily="34" charset="0"/>
+              <a:buAutoNum type="arabicPeriod"/>
+            </a:pPr>
+            <a:r>
+              <a:rPr lang="es-ES" sz="2600" dirty="0">
+                <a:solidFill>
+                  <a:schemeClr val="tx1"/>
+                </a:solidFill>
+                <a:cs typeface="Arial" charset="0"/>
+              </a:rPr>
+              <a:t>Metodología de trabajo</a:t>
+            </a:r>
+          </a:p>
+          <a:p>
+            <a:pPr marL="566738" indent="-457200">
+              <a:buFont typeface="Trebuchet MS" pitchFamily="34" charset="0"/>
+              <a:buAutoNum type="arabicPeriod"/>
+            </a:pPr>
+            <a:r>
+              <a:rPr lang="es-ES" sz="2600" dirty="0">
+                <a:solidFill>
+                  <a:schemeClr val="tx1"/>
+                </a:solidFill>
+                <a:cs typeface="Arial" charset="0"/>
+              </a:rPr>
+              <a:t>Nuestro cliente</a:t>
+            </a:r>
+          </a:p>
+          <a:p>
+            <a:pPr marL="566738" indent="-457200">
+              <a:buFont typeface="Trebuchet MS" pitchFamily="34" charset="0"/>
+              <a:buAutoNum type="arabicPeriod"/>
+            </a:pPr>
+            <a:r>
+              <a:rPr lang="es-ES" sz="2600" dirty="0">
+                <a:solidFill>
+                  <a:schemeClr val="tx1"/>
+                </a:solidFill>
+                <a:cs typeface="Arial" charset="0"/>
+              </a:rPr>
+              <a:t>Nuestra solución</a:t>
+            </a:r>
+          </a:p>
+          <a:p>
+            <a:pPr marL="566738" indent="-457200">
+              <a:buFont typeface="Trebuchet MS" pitchFamily="34" charset="0"/>
+              <a:buAutoNum type="arabicPeriod"/>
+            </a:pPr>
+            <a:r>
+              <a:rPr lang="es-ES" sz="2600" dirty="0">
+                <a:solidFill>
+                  <a:schemeClr val="tx1"/>
+                </a:solidFill>
+                <a:cs typeface="Arial" charset="0"/>
+              </a:rPr>
+              <a:t>Proyecto - Logros/Próximos pasos</a:t>
+            </a:r>
+          </a:p>
+          <a:p>
+            <a:pPr marL="566738" indent="-457200">
+              <a:buFont typeface="Trebuchet MS" pitchFamily="34" charset="0"/>
+              <a:buAutoNum type="arabicPeriod"/>
+            </a:pPr>
+            <a:r>
+              <a:rPr lang="es-ES" sz="2600" dirty="0">
+                <a:solidFill>
+                  <a:schemeClr val="tx1"/>
+                </a:solidFill>
+                <a:cs typeface="Arial" charset="0"/>
+              </a:rPr>
+              <a:t>Lecciones aprendidas</a:t>
+            </a:r>
+          </a:p>
+          <a:p>
+            <a:pPr marL="0" indent="0">
+              <a:buNone/>
+            </a:pPr>
+            <a:endParaRPr lang="es-AR" dirty="0"/>
+          </a:p>
+        </p:txBody>
+      </p:sp>
+      <p:sp>
+        <p:nvSpPr>
+          <p:cNvPr id="3" name="2 Título"/>
+          <p:cNvSpPr>
+            <a:spLocks noGrp="1"/>
+          </p:cNvSpPr>
+          <p:nvPr>
+            <p:ph type="title"/>
+          </p:nvPr>
+        </p:nvSpPr>
+        <p:spPr>
+          <a:xfrm>
+            <a:off x="457200" y="359465"/>
+            <a:ext cx="4186808" cy="1143000"/>
+          </a:xfrm>
+        </p:spPr>
+        <p:txBody>
+          <a:bodyPr/>
+          <a:lstStyle/>
+          <a:p>
+            <a:r>
+              <a:rPr lang="en-US" b="1" dirty="0"/>
+              <a:t>Agenda:</a:t>
+            </a:r>
+            <a:endParaRPr lang="es-AR" dirty="0"/>
+          </a:p>
+        </p:txBody>
+      </p:sp>
+      <p:pic>
+        <p:nvPicPr>
+          <p:cNvPr id="4" name="3 Imagen"/>
+          <p:cNvPicPr>
+            <a:picLocks noChangeAspect="1"/>
+          </p:cNvPicPr>
+          <p:nvPr/>
+        </p:nvPicPr>
+        <p:blipFill>
+          <a:blip r:embed="rId2">
+            <a:extLst>
+              <a:ext uri="{28A0092B-C50C-407E-A947-70E740481C1C}">
+                <a14:useLocalDpi xmlns:a14="http://schemas.microsoft.com/office/drawing/2010/main" val="0"/>
+              </a:ext>
+            </a:extLst>
+          </a:blip>
+          <a:stretch>
+            <a:fillRect/>
+          </a:stretch>
+        </p:blipFill>
+        <p:spPr>
+          <a:xfrm>
+            <a:off x="4572000" y="0"/>
+            <a:ext cx="4572000" cy="1340768"/>
+          </a:xfrm>
+          <a:prstGeom prst="rect">
+            <a:avLst/>
+          </a:prstGeom>
+        </p:spPr>
+      </p:pic>
+    </p:spTree>
+    <p:extLst>
+      <p:ext uri="{BB962C8B-B14F-4D97-AF65-F5344CB8AC3E}">
+        <p14:creationId xmlns:p14="http://schemas.microsoft.com/office/powerpoint/2010/main" val="3771870910"/>
+      </p:ext>
+    </p:extLst>
+  </p:cSld>
+  <p:clrMapOvr>
+    <a:masterClrMapping/>
+  </p:clrMapOvr>
+  <p:timing>
+    <p:tnLst>
+      <p:par>
+        <p:cTn id="1" dur="indefinite" restart="never" nodeType="tmRoot"/>
+      </p:par>
+    </p:tnLst>
+  </p:timing>
+</p:sld>
+</file>
+
+<file path=ppt/slides/slide4.xml><?xml version="1.0" encoding="utf-8"?>
+<p:sld xmlns:a="http://schemas.openxmlformats.org/drawingml/2006/main" xmlns:r="http://schemas.openxmlformats.org/officeDocument/2006/relationships" xmlns:p="http://schemas.openxmlformats.org/presentationml/2006/main">
+  <p:cSld>
+    <p:spTree>
+      <p:nvGrpSpPr>
+        <p:cNvPr id="1" name=""/>
+        <p:cNvGrpSpPr/>
+        <p:nvPr/>
+      </p:nvGrpSpPr>
+      <p:grpSpPr>
+        <a:xfrm>
+          <a:off x="0" y="0"/>
+          <a:ext cx="0" cy="0"/>
+          <a:chOff x="0" y="0"/>
+          <a:chExt cx="0" cy="0"/>
+        </a:xfrm>
+      </p:grpSpPr>
+      <p:sp>
+        <p:nvSpPr>
+          <p:cNvPr id="2" name="1 Marcador de texto"/>
+          <p:cNvSpPr>
+            <a:spLocks noGrp="1"/>
+          </p:cNvSpPr>
+          <p:nvPr>
+            <p:ph type="body" idx="1"/>
+          </p:nvPr>
+        </p:nvSpPr>
+        <p:spPr/>
+        <p:txBody>
+          <a:bodyPr/>
+          <a:lstStyle/>
+          <a:p>
+            <a:pPr marL="0" indent="0" algn="ctr">
+              <a:buNone/>
+            </a:pPr>
+            <a:endParaRPr lang="en-US" dirty="0" smtClean="0"/>
+          </a:p>
+          <a:p>
+            <a:pPr marL="0" indent="0" algn="ctr">
+              <a:buNone/>
+            </a:pPr>
+            <a:endParaRPr lang="en-US" b="1" dirty="0" smtClean="0"/>
+          </a:p>
+          <a:p>
+            <a:pPr marL="0" indent="0" algn="ctr">
+              <a:buNone/>
+            </a:pPr>
+            <a:r>
+              <a:rPr lang="en-US" b="1" dirty="0" err="1" smtClean="0"/>
+              <a:t>Equipo</a:t>
+            </a:r>
+            <a:r>
+              <a:rPr lang="en-US" b="1" dirty="0" smtClean="0"/>
+              <a:t> de </a:t>
+            </a:r>
+            <a:r>
+              <a:rPr lang="en-US" b="1" dirty="0" err="1" smtClean="0"/>
+              <a:t>Trabajo</a:t>
+            </a:r>
+            <a:endParaRPr lang="en-US" b="1" dirty="0" smtClean="0"/>
+          </a:p>
+          <a:p>
+            <a:pPr marL="0" indent="0" algn="ctr">
+              <a:buNone/>
+            </a:pPr>
+            <a:endParaRPr lang="en-US" dirty="0"/>
+          </a:p>
+          <a:p>
+            <a:pPr lvl="6" algn="l">
+              <a:buFont typeface="Arial" pitchFamily="34" charset="0"/>
+              <a:buChar char="•"/>
+            </a:pPr>
+            <a:r>
+              <a:rPr lang="en-US" sz="2600" dirty="0" err="1" smtClean="0">
+                <a:latin typeface="+mn-lt"/>
+              </a:rPr>
+              <a:t>Damián</a:t>
+            </a:r>
+            <a:r>
+              <a:rPr lang="en-US" sz="2600" dirty="0" smtClean="0">
+                <a:latin typeface="+mn-lt"/>
+              </a:rPr>
+              <a:t> </a:t>
+            </a:r>
+            <a:r>
+              <a:rPr lang="en-US" sz="2600" dirty="0" err="1" smtClean="0">
+                <a:latin typeface="+mn-lt"/>
+              </a:rPr>
+              <a:t>Lescano</a:t>
+            </a:r>
+            <a:endParaRPr lang="en-US" sz="2600" dirty="0" smtClean="0">
+              <a:latin typeface="+mn-lt"/>
+            </a:endParaRPr>
+          </a:p>
+          <a:p>
+            <a:pPr lvl="6" algn="l">
+              <a:buFont typeface="Arial" pitchFamily="34" charset="0"/>
+              <a:buChar char="•"/>
+            </a:pPr>
+            <a:r>
+              <a:rPr lang="en-US" sz="2600" dirty="0" smtClean="0">
+                <a:latin typeface="+mn-lt"/>
+              </a:rPr>
+              <a:t>Esteban </a:t>
+            </a:r>
+            <a:r>
+              <a:rPr lang="en-US" sz="2600" dirty="0" err="1" smtClean="0">
+                <a:latin typeface="+mn-lt"/>
+              </a:rPr>
+              <a:t>Arnaldo</a:t>
+            </a:r>
+            <a:endParaRPr lang="en-US" sz="2600" dirty="0" smtClean="0">
+              <a:latin typeface="+mn-lt"/>
+            </a:endParaRPr>
+          </a:p>
+          <a:p>
+            <a:pPr lvl="6" algn="l">
+              <a:buFont typeface="Arial" pitchFamily="34" charset="0"/>
+              <a:buChar char="•"/>
+            </a:pPr>
+            <a:r>
+              <a:rPr lang="en-US" sz="2600" dirty="0" err="1" smtClean="0">
+                <a:latin typeface="+mn-lt"/>
+              </a:rPr>
+              <a:t>Ezequiel</a:t>
+            </a:r>
+            <a:r>
+              <a:rPr lang="en-US" sz="2600" dirty="0" smtClean="0">
+                <a:latin typeface="+mn-lt"/>
+              </a:rPr>
+              <a:t> </a:t>
+            </a:r>
+            <a:r>
+              <a:rPr lang="en-US" sz="2600" dirty="0" err="1" smtClean="0">
+                <a:latin typeface="+mn-lt"/>
+              </a:rPr>
+              <a:t>Fernández</a:t>
+            </a:r>
+            <a:endParaRPr lang="en-US" sz="2600" dirty="0" smtClean="0">
+              <a:latin typeface="+mn-lt"/>
+            </a:endParaRPr>
+          </a:p>
+          <a:p>
+            <a:pPr lvl="6" algn="l">
+              <a:buFont typeface="Arial" pitchFamily="34" charset="0"/>
+              <a:buChar char="•"/>
+            </a:pPr>
+            <a:r>
+              <a:rPr lang="en-US" sz="2600" dirty="0" smtClean="0">
+                <a:latin typeface="+mn-lt"/>
+              </a:rPr>
+              <a:t>Sebastian </a:t>
+            </a:r>
+            <a:r>
+              <a:rPr lang="en-US" sz="2600" dirty="0" err="1" smtClean="0">
+                <a:latin typeface="+mn-lt"/>
+              </a:rPr>
+              <a:t>Arrata</a:t>
+            </a:r>
+            <a:endParaRPr lang="en-US" sz="2600" dirty="0" smtClean="0">
+              <a:latin typeface="+mn-lt"/>
+            </a:endParaRPr>
+          </a:p>
+          <a:p>
+            <a:pPr marL="0" indent="0" algn="ctr">
+              <a:buNone/>
+            </a:pPr>
+            <a:endParaRPr lang="en-US" dirty="0" smtClean="0"/>
+          </a:p>
+          <a:p>
+            <a:pPr marL="0" indent="0" algn="ctr">
+              <a:buNone/>
+            </a:pPr>
+            <a:endParaRPr lang="en-US" dirty="0"/>
+          </a:p>
+          <a:p>
+            <a:pPr marL="0" indent="0" algn="ctr">
+              <a:buNone/>
+            </a:pPr>
+            <a:endParaRPr lang="es-AR" dirty="0"/>
+          </a:p>
+        </p:txBody>
+      </p:sp>
+      <p:sp>
+        <p:nvSpPr>
+          <p:cNvPr id="3" name="2 Título"/>
+          <p:cNvSpPr>
+            <a:spLocks noGrp="1"/>
+          </p:cNvSpPr>
+          <p:nvPr>
+            <p:ph type="title"/>
+          </p:nvPr>
+        </p:nvSpPr>
+        <p:spPr>
+          <a:xfrm>
+            <a:off x="457200" y="359465"/>
+            <a:ext cx="4114800" cy="1143000"/>
+          </a:xfrm>
+        </p:spPr>
+        <p:txBody>
+          <a:bodyPr>
+            <a:normAutofit/>
+          </a:bodyPr>
+          <a:lstStyle/>
+          <a:p>
+            <a:r>
+              <a:rPr lang="es-ES" sz="3200" b="1" dirty="0">
+                <a:solidFill>
+                  <a:schemeClr val="tx1"/>
+                </a:solidFill>
+                <a:cs typeface="Arial" charset="0"/>
+              </a:rPr>
+              <a:t>¿Quienes Somos</a:t>
+            </a:r>
+            <a:r>
+              <a:rPr lang="es-ES" sz="3200" b="1" dirty="0" smtClean="0">
+                <a:solidFill>
+                  <a:schemeClr val="tx1"/>
+                </a:solidFill>
+                <a:cs typeface="Arial" charset="0"/>
+              </a:rPr>
+              <a:t>?</a:t>
+            </a:r>
+            <a:endParaRPr lang="es-AR" sz="3200" b="1" dirty="0">
+              <a:solidFill>
+                <a:schemeClr val="tx1"/>
+              </a:solidFill>
+            </a:endParaRPr>
+          </a:p>
+        </p:txBody>
+      </p:sp>
+      <p:pic>
+        <p:nvPicPr>
+          <p:cNvPr id="4" name="3 Imagen"/>
+          <p:cNvPicPr>
+            <a:picLocks noChangeAspect="1"/>
+          </p:cNvPicPr>
+          <p:nvPr/>
+        </p:nvPicPr>
+        <p:blipFill>
+          <a:blip r:embed="rId2">
+            <a:extLst>
+              <a:ext uri="{28A0092B-C50C-407E-A947-70E740481C1C}">
+                <a14:useLocalDpi xmlns:a14="http://schemas.microsoft.com/office/drawing/2010/main" val="0"/>
+              </a:ext>
+            </a:extLst>
+          </a:blip>
+          <a:stretch>
+            <a:fillRect/>
+          </a:stretch>
+        </p:blipFill>
+        <p:spPr>
+          <a:xfrm>
+            <a:off x="4572000" y="0"/>
+            <a:ext cx="4572000" cy="1340768"/>
+          </a:xfrm>
+          <a:prstGeom prst="rect">
+            <a:avLst/>
+          </a:prstGeom>
+        </p:spPr>
+      </p:pic>
+    </p:spTree>
+    <p:extLst>
+      <p:ext uri="{BB962C8B-B14F-4D97-AF65-F5344CB8AC3E}">
+        <p14:creationId xmlns:p14="http://schemas.microsoft.com/office/powerpoint/2010/main" val="1613793215"/>
+      </p:ext>
+    </p:extLst>
+  </p:cSld>
+  <p:clrMapOvr>
+    <a:masterClrMapping/>
+  </p:clrMapOvr>
+  <p:timing>
+    <p:tnLst>
+      <p:par>
+        <p:cTn id="1" dur="indefinite" restart="never" nodeType="tmRoot"/>
+      </p:par>
+    </p:tnLst>
+  </p:timing>
+</p:sld>
+</file>
+
+<file path=ppt/slides/slide5.xml><?xml version="1.0" encoding="utf-8"?>
+<p:sld xmlns:a="http://schemas.openxmlformats.org/drawingml/2006/main" xmlns:r="http://schemas.openxmlformats.org/officeDocument/2006/relationships" xmlns:p="http://schemas.openxmlformats.org/presentationml/2006/main">
+  <p:cSld>
+    <p:spTree>
+      <p:nvGrpSpPr>
+        <p:cNvPr id="1" name=""/>
+        <p:cNvGrpSpPr/>
+        <p:nvPr/>
+      </p:nvGrpSpPr>
+      <p:grpSpPr>
+        <a:xfrm>
+          <a:off x="0" y="0"/>
+          <a:ext cx="0" cy="0"/>
+          <a:chOff x="0" y="0"/>
+          <a:chExt cx="0" cy="0"/>
+        </a:xfrm>
+      </p:grpSpPr>
+      <p:sp>
+        <p:nvSpPr>
+          <p:cNvPr id="2" name="1 Marcador de texto"/>
+          <p:cNvSpPr>
+            <a:spLocks noGrp="1"/>
+          </p:cNvSpPr>
+          <p:nvPr>
+            <p:ph type="body" idx="1"/>
+          </p:nvPr>
+        </p:nvSpPr>
+        <p:spPr/>
+        <p:txBody>
+          <a:bodyPr/>
+          <a:lstStyle/>
+          <a:p>
+            <a:pPr marL="0" indent="0">
+              <a:buNone/>
+            </a:pPr>
+            <a:endParaRPr lang="en-US" sz="1800" dirty="0" smtClean="0"/>
+          </a:p>
+          <a:p>
+            <a:r>
+              <a:rPr lang="en-US" sz="2600" b="1" dirty="0" smtClean="0"/>
+              <a:t>SOLUTION</a:t>
+            </a:r>
+            <a:r>
+              <a:rPr lang="en-US" sz="2600" dirty="0" smtClean="0"/>
+              <a:t> </a:t>
+            </a:r>
+            <a:r>
+              <a:rPr lang="es-AR" sz="2600" dirty="0" smtClean="0"/>
+              <a:t>nació </a:t>
+            </a:r>
+            <a:r>
+              <a:rPr lang="es-AR" sz="2600" dirty="0"/>
+              <a:t>para brindar </a:t>
+            </a:r>
+            <a:r>
+              <a:rPr lang="es-AR" sz="2600" dirty="0" smtClean="0"/>
+              <a:t>servicio </a:t>
+            </a:r>
+            <a:r>
+              <a:rPr lang="es-AR" sz="2600" dirty="0"/>
+              <a:t>integral de desarrollo de soluciones web, combinando alta tecnología, facilidad de uso, arquitectura, programación </a:t>
+            </a:r>
+            <a:r>
+              <a:rPr lang="es-AR" sz="2600" dirty="0" smtClean="0"/>
+              <a:t>y un </a:t>
+            </a:r>
+            <a:r>
+              <a:rPr lang="es-AR" sz="2600" dirty="0"/>
+              <a:t>firme compromiso con la obtención de resultados y la entrega a tiempo. </a:t>
+            </a:r>
+            <a:endParaRPr lang="es-AR" sz="2600" dirty="0" smtClean="0"/>
+          </a:p>
+          <a:p>
+            <a:endParaRPr lang="en-US" sz="2600" dirty="0"/>
+          </a:p>
+          <a:p>
+            <a:r>
+              <a:rPr lang="en-US" sz="2600" dirty="0" err="1" smtClean="0"/>
+              <a:t>Garantizamos</a:t>
+            </a:r>
+            <a:r>
+              <a:rPr lang="en-US" sz="2600" dirty="0" smtClean="0"/>
+              <a:t>  el </a:t>
+            </a:r>
+            <a:r>
+              <a:rPr lang="en-US" sz="2600" dirty="0" err="1" smtClean="0"/>
+              <a:t>trabajo</a:t>
+            </a:r>
+            <a:r>
+              <a:rPr lang="en-US" sz="2600" dirty="0" smtClean="0"/>
+              <a:t> en </a:t>
+            </a:r>
+            <a:r>
+              <a:rPr lang="en-US" sz="2600" dirty="0" err="1" smtClean="0"/>
+              <a:t>equipo</a:t>
+            </a:r>
+            <a:r>
+              <a:rPr lang="en-US" sz="2600" dirty="0" smtClean="0"/>
+              <a:t> con el </a:t>
+            </a:r>
+            <a:r>
+              <a:rPr lang="en-US" sz="2600" dirty="0" err="1" smtClean="0"/>
+              <a:t>cliente</a:t>
+            </a:r>
+            <a:r>
+              <a:rPr lang="en-US" sz="2600" dirty="0" smtClean="0"/>
+              <a:t> </a:t>
+            </a:r>
+            <a:r>
+              <a:rPr lang="en-US" sz="2600" dirty="0" err="1" smtClean="0"/>
+              <a:t>para</a:t>
+            </a:r>
+            <a:r>
+              <a:rPr lang="en-US" sz="2600" dirty="0" smtClean="0"/>
+              <a:t> </a:t>
+            </a:r>
+            <a:r>
+              <a:rPr lang="en-US" sz="2600" dirty="0" err="1" smtClean="0"/>
+              <a:t>lograr</a:t>
+            </a:r>
+            <a:r>
+              <a:rPr lang="en-US" sz="2600" dirty="0" smtClean="0"/>
+              <a:t> un </a:t>
+            </a:r>
+            <a:r>
+              <a:rPr lang="en-US" sz="2600" dirty="0" err="1" smtClean="0"/>
+              <a:t>producto</a:t>
+            </a:r>
+            <a:r>
+              <a:rPr lang="en-US" sz="2600" dirty="0" smtClean="0"/>
+              <a:t> final de optima </a:t>
+            </a:r>
+            <a:r>
+              <a:rPr lang="en-US" sz="2600" dirty="0" err="1" smtClean="0"/>
+              <a:t>calidad</a:t>
+            </a:r>
+            <a:r>
+              <a:rPr lang="en-US" sz="2600" dirty="0" smtClean="0"/>
+              <a:t> a la </a:t>
+            </a:r>
+            <a:r>
+              <a:rPr lang="en-US" sz="2600" dirty="0" err="1" smtClean="0"/>
+              <a:t>medida</a:t>
+            </a:r>
+            <a:r>
+              <a:rPr lang="en-US" sz="2600" dirty="0" smtClean="0"/>
+              <a:t> de </a:t>
+            </a:r>
+            <a:r>
+              <a:rPr lang="en-US" sz="2600" dirty="0" err="1" smtClean="0"/>
+              <a:t>sus</a:t>
+            </a:r>
+            <a:r>
+              <a:rPr lang="en-US" sz="2600" dirty="0" smtClean="0"/>
+              <a:t> </a:t>
+            </a:r>
+            <a:r>
+              <a:rPr lang="en-US" sz="2600" dirty="0" err="1" smtClean="0"/>
+              <a:t>necesidades</a:t>
+            </a:r>
+            <a:r>
+              <a:rPr lang="en-US" sz="2600" dirty="0"/>
+              <a:t>.</a:t>
+            </a:r>
+            <a:endParaRPr lang="es-AR" sz="2600" dirty="0"/>
+          </a:p>
+        </p:txBody>
+      </p:sp>
+      <p:sp>
+        <p:nvSpPr>
+          <p:cNvPr id="3" name="2 Título"/>
+          <p:cNvSpPr>
+            <a:spLocks noGrp="1"/>
+          </p:cNvSpPr>
+          <p:nvPr>
+            <p:ph type="title"/>
+          </p:nvPr>
+        </p:nvSpPr>
+        <p:spPr>
+          <a:xfrm>
+            <a:off x="457200" y="359465"/>
+            <a:ext cx="4114800" cy="1143000"/>
+          </a:xfrm>
+        </p:spPr>
+        <p:txBody>
+          <a:bodyPr>
+            <a:normAutofit/>
+          </a:bodyPr>
+          <a:lstStyle/>
+          <a:p>
+            <a:r>
+              <a:rPr lang="es-ES" sz="3200" b="1" dirty="0">
+                <a:solidFill>
+                  <a:schemeClr val="tx1"/>
+                </a:solidFill>
+                <a:cs typeface="Arial" charset="0"/>
+              </a:rPr>
+              <a:t>¿Quienes Somos?</a:t>
+            </a:r>
+            <a:endParaRPr lang="es-AR" sz="3200" b="1" dirty="0"/>
+          </a:p>
+        </p:txBody>
+      </p:sp>
+      <p:pic>
+        <p:nvPicPr>
+          <p:cNvPr id="4" name="3 Imagen"/>
+          <p:cNvPicPr>
+            <a:picLocks noChangeAspect="1"/>
+          </p:cNvPicPr>
+          <p:nvPr/>
+        </p:nvPicPr>
+        <p:blipFill>
+          <a:blip r:embed="rId2">
+            <a:extLst>
+              <a:ext uri="{28A0092B-C50C-407E-A947-70E740481C1C}">
+                <a14:useLocalDpi xmlns:a14="http://schemas.microsoft.com/office/drawing/2010/main" val="0"/>
+              </a:ext>
+            </a:extLst>
+          </a:blip>
+          <a:stretch>
+            <a:fillRect/>
+          </a:stretch>
+        </p:blipFill>
+        <p:spPr>
+          <a:xfrm>
+            <a:off x="4572000" y="0"/>
+            <a:ext cx="4572000" cy="1340768"/>
+          </a:xfrm>
+          <a:prstGeom prst="rect">
+            <a:avLst/>
+          </a:prstGeom>
+        </p:spPr>
+      </p:pic>
+    </p:spTree>
+    <p:extLst>
+      <p:ext uri="{BB962C8B-B14F-4D97-AF65-F5344CB8AC3E}">
+        <p14:creationId xmlns:p14="http://schemas.microsoft.com/office/powerpoint/2010/main" val="839861251"/>
+      </p:ext>
+    </p:extLst>
+  </p:cSld>
+  <p:clrMapOvr>
+    <a:masterClrMapping/>
+  </p:clrMapOvr>
+  <p:timing>
+    <p:tnLst>
+      <p:par>
+        <p:cTn id="1" dur="indefinite" restart="never" nodeType="tmRoot"/>
+      </p:par>
+    </p:tnLst>
+  </p:timing>
+</p:sld>
+</file>
+
+<file path=ppt/slides/slide6.xml><?xml version="1.0" encoding="utf-8"?>
+<p:sld xmlns:a="http://schemas.openxmlformats.org/drawingml/2006/main" xmlns:r="http://schemas.openxmlformats.org/officeDocument/2006/relationships" xmlns:p="http://schemas.openxmlformats.org/presentationml/2006/main">
+  <p:cSld>
+    <p:spTree>
+      <p:nvGrpSpPr>
+        <p:cNvPr id="1" name=""/>
+        <p:cNvGrpSpPr/>
+        <p:nvPr/>
+      </p:nvGrpSpPr>
+      <p:grpSpPr>
+        <a:xfrm>
+          <a:off x="0" y="0"/>
+          <a:ext cx="0" cy="0"/>
+          <a:chOff x="0" y="0"/>
+          <a:chExt cx="0" cy="0"/>
+        </a:xfrm>
+      </p:grpSpPr>
+      <p:sp>
+        <p:nvSpPr>
+          <p:cNvPr id="2" name="1 Marcador de texto"/>
+          <p:cNvSpPr>
+            <a:spLocks noGrp="1"/>
+          </p:cNvSpPr>
+          <p:nvPr>
+            <p:ph type="body" idx="1"/>
+          </p:nvPr>
+        </p:nvSpPr>
+        <p:spPr>
+          <a:xfrm>
+            <a:off x="457200" y="1600200"/>
+            <a:ext cx="8229600" cy="4997152"/>
+          </a:xfrm>
+        </p:spPr>
+        <p:txBody>
+          <a:bodyPr>
+            <a:normAutofit fontScale="77500" lnSpcReduction="20000"/>
+          </a:bodyPr>
+          <a:lstStyle/>
+          <a:p>
+            <a:pPr marL="0" indent="0" algn="ctr">
+              <a:buNone/>
+            </a:pPr>
+            <a:r>
+              <a:rPr lang="en-US" sz="4000" b="1" dirty="0" err="1" smtClean="0">
+                <a:solidFill>
+                  <a:schemeClr val="tx1"/>
+                </a:solidFill>
+                <a:latin typeface="+mj-lt"/>
+              </a:rPr>
+              <a:t>Misión</a:t>
+            </a:r>
+            <a:r>
+              <a:rPr lang="en-US" sz="4000" b="1" dirty="0">
+                <a:solidFill>
+                  <a:schemeClr val="tx1"/>
+                </a:solidFill>
+                <a:latin typeface="+mj-lt"/>
+              </a:rPr>
+              <a:t>,</a:t>
+            </a:r>
+            <a:r>
+              <a:rPr lang="en-US" sz="4000" b="1" dirty="0" smtClean="0">
+                <a:solidFill>
+                  <a:schemeClr val="tx1"/>
+                </a:solidFill>
+                <a:latin typeface="+mj-lt"/>
+              </a:rPr>
+              <a:t> </a:t>
+            </a:r>
+            <a:r>
+              <a:rPr lang="en-US" sz="4000" b="1" dirty="0" err="1" smtClean="0">
+                <a:solidFill>
+                  <a:schemeClr val="tx1"/>
+                </a:solidFill>
+                <a:latin typeface="+mj-lt"/>
+              </a:rPr>
+              <a:t>Visión</a:t>
+            </a:r>
+            <a:r>
+              <a:rPr lang="en-US" sz="4000" b="1" dirty="0" smtClean="0">
+                <a:solidFill>
+                  <a:schemeClr val="tx1"/>
+                </a:solidFill>
+                <a:latin typeface="+mj-lt"/>
+              </a:rPr>
+              <a:t> y </a:t>
+            </a:r>
+            <a:r>
+              <a:rPr lang="en-US" sz="4000" b="1" dirty="0" err="1" smtClean="0">
+                <a:solidFill>
+                  <a:schemeClr val="tx1"/>
+                </a:solidFill>
+                <a:latin typeface="+mj-lt"/>
+              </a:rPr>
+              <a:t>Valores</a:t>
+            </a:r>
+            <a:endParaRPr lang="en-US" sz="4000" b="1" dirty="0" smtClean="0">
+              <a:solidFill>
+                <a:schemeClr val="tx1"/>
+              </a:solidFill>
+              <a:latin typeface="+mj-lt"/>
+            </a:endParaRPr>
+          </a:p>
+          <a:p>
+            <a:pPr marL="0" indent="0" algn="ctr">
+              <a:buNone/>
+            </a:pPr>
+            <a:endParaRPr lang="en-US" sz="2900" dirty="0">
+              <a:solidFill>
+                <a:schemeClr val="tx1"/>
+              </a:solidFill>
+            </a:endParaRPr>
+          </a:p>
+          <a:p>
+            <a:pPr marL="0" indent="0">
+              <a:spcBef>
+                <a:spcPct val="50000"/>
+              </a:spcBef>
+              <a:buNone/>
+            </a:pPr>
+            <a:r>
+              <a:rPr lang="es-AR" sz="2600" b="1" dirty="0">
+                <a:solidFill>
+                  <a:schemeClr val="tx1"/>
+                </a:solidFill>
+                <a:cs typeface="Times New Roman" pitchFamily="18" charset="0"/>
+              </a:rPr>
+              <a:t>Misión</a:t>
+            </a:r>
+          </a:p>
+          <a:p>
+            <a:pPr marL="457200" lvl="1" indent="0">
+              <a:spcBef>
+                <a:spcPct val="50000"/>
+              </a:spcBef>
+              <a:buNone/>
+            </a:pPr>
+            <a:r>
+              <a:rPr lang="es-AR" sz="2600" dirty="0">
+                <a:solidFill>
+                  <a:schemeClr val="tx1"/>
+                </a:solidFill>
+              </a:rPr>
+              <a:t>Ofrecer soluciones de negocio basadas en los más modernos conceptos de la administración, utilizando metodologías, tecnologías y herramientas innovadoras para facilitar la transmisión, implantación, asimilación y adopción de las soluciones ofrecidas, para contribuir al éxito, eficiencia y rentabilidad de nuestros clientes. </a:t>
+            </a:r>
+          </a:p>
+          <a:p>
+            <a:pPr>
+              <a:spcBef>
+                <a:spcPct val="50000"/>
+              </a:spcBef>
+              <a:buNone/>
+            </a:pPr>
+            <a:r>
+              <a:rPr lang="es-AR" sz="2600" b="1" dirty="0">
+                <a:solidFill>
+                  <a:schemeClr val="tx1"/>
+                </a:solidFill>
+                <a:cs typeface="Times New Roman" pitchFamily="18" charset="0"/>
+              </a:rPr>
+              <a:t>Visión</a:t>
+            </a:r>
+          </a:p>
+          <a:p>
+            <a:pPr marL="457200" lvl="1" indent="0">
+              <a:spcBef>
+                <a:spcPct val="50000"/>
+              </a:spcBef>
+              <a:buNone/>
+            </a:pPr>
+            <a:r>
+              <a:rPr lang="es-AR" sz="2600" dirty="0">
+                <a:solidFill>
+                  <a:schemeClr val="tx1"/>
+                </a:solidFill>
+              </a:rPr>
+              <a:t>Convertirnos en una empresa líder a nivel nacional e internacional de la industria de servicios, desarrollo e implementación de sistemas. </a:t>
+            </a:r>
+          </a:p>
+          <a:p>
+            <a:pPr marL="0" indent="0">
+              <a:spcBef>
+                <a:spcPct val="50000"/>
+              </a:spcBef>
+              <a:buNone/>
+            </a:pPr>
+            <a:r>
+              <a:rPr lang="es-AR" sz="2600" b="1" dirty="0">
+                <a:solidFill>
+                  <a:schemeClr val="tx1"/>
+                </a:solidFill>
+                <a:cs typeface="Times New Roman" pitchFamily="18" charset="0"/>
+              </a:rPr>
+              <a:t>Valores</a:t>
+            </a:r>
+          </a:p>
+          <a:p>
+            <a:pPr marL="457200" lvl="1" indent="0">
+              <a:spcBef>
+                <a:spcPct val="50000"/>
+              </a:spcBef>
+              <a:buNone/>
+            </a:pPr>
+            <a:r>
+              <a:rPr lang="es-AR" sz="2600" dirty="0">
+                <a:solidFill>
+                  <a:schemeClr val="tx1"/>
+                </a:solidFill>
+              </a:rPr>
+              <a:t>Compromiso y pasión por la excelencia, la orientación al cliente, la </a:t>
+            </a:r>
+            <a:r>
+              <a:rPr lang="es-AR" sz="2600" dirty="0" smtClean="0">
+                <a:solidFill>
+                  <a:schemeClr val="tx1"/>
+                </a:solidFill>
+              </a:rPr>
+              <a:t>investigación, </a:t>
+            </a:r>
+            <a:r>
+              <a:rPr lang="es-AR" sz="2600" dirty="0">
+                <a:solidFill>
+                  <a:schemeClr val="tx1"/>
+                </a:solidFill>
+              </a:rPr>
+              <a:t>el trabajo en equipo, la competitividad y respeto por su gente y la calidad de vida.</a:t>
+            </a:r>
+          </a:p>
+          <a:p>
+            <a:pPr marL="0" indent="0" algn="l">
+              <a:buNone/>
+            </a:pPr>
+            <a:endParaRPr lang="es-AR" dirty="0"/>
+          </a:p>
+        </p:txBody>
+      </p:sp>
+      <p:sp>
+        <p:nvSpPr>
+          <p:cNvPr id="3" name="2 Título"/>
+          <p:cNvSpPr>
+            <a:spLocks noGrp="1"/>
+          </p:cNvSpPr>
+          <p:nvPr>
+            <p:ph type="title"/>
+          </p:nvPr>
+        </p:nvSpPr>
+        <p:spPr>
+          <a:xfrm>
+            <a:off x="457200" y="359465"/>
+            <a:ext cx="4114800" cy="1143000"/>
+          </a:xfrm>
+        </p:spPr>
+        <p:txBody>
+          <a:bodyPr>
+            <a:normAutofit/>
+          </a:bodyPr>
+          <a:lstStyle/>
+          <a:p>
+            <a:r>
+              <a:rPr lang="es-ES" sz="3200" b="1" dirty="0">
+                <a:solidFill>
+                  <a:schemeClr val="tx1"/>
+                </a:solidFill>
+                <a:cs typeface="Arial" charset="0"/>
+              </a:rPr>
+              <a:t>¿Quienes Somos?</a:t>
+            </a:r>
+            <a:endParaRPr lang="es-AR" sz="3200" dirty="0"/>
+          </a:p>
+        </p:txBody>
+      </p:sp>
+      <p:pic>
+        <p:nvPicPr>
+          <p:cNvPr id="4" name="3 Imagen"/>
+          <p:cNvPicPr>
+            <a:picLocks noChangeAspect="1"/>
+          </p:cNvPicPr>
+          <p:nvPr/>
+        </p:nvPicPr>
+        <p:blipFill>
+          <a:blip r:embed="rId2">
+            <a:extLst>
+              <a:ext uri="{28A0092B-C50C-407E-A947-70E740481C1C}">
+                <a14:useLocalDpi xmlns:a14="http://schemas.microsoft.com/office/drawing/2010/main" val="0"/>
+              </a:ext>
+            </a:extLst>
+          </a:blip>
+          <a:stretch>
+            <a:fillRect/>
+          </a:stretch>
+        </p:blipFill>
+        <p:spPr>
+          <a:xfrm>
+            <a:off x="4572000" y="0"/>
+            <a:ext cx="4572000" cy="1340768"/>
+          </a:xfrm>
+          <a:prstGeom prst="rect">
+            <a:avLst/>
+          </a:prstGeom>
+        </p:spPr>
+      </p:pic>
+    </p:spTree>
+    <p:extLst>
+      <p:ext uri="{BB962C8B-B14F-4D97-AF65-F5344CB8AC3E}">
+        <p14:creationId xmlns:p14="http://schemas.microsoft.com/office/powerpoint/2010/main" val="1072269879"/>
+      </p:ext>
+    </p:extLst>
+  </p:cSld>
+  <p:clrMapOvr>
+    <a:masterClrMapping/>
+  </p:clrMapOvr>
+</p:sld>
+</file>
+
+<file path=ppt/slides/slide7.xml><?xml version="1.0" encoding="utf-8"?>
+<p:sld xmlns:a="http://schemas.openxmlformats.org/drawingml/2006/main" xmlns:r="http://schemas.openxmlformats.org/officeDocument/2006/relationships" xmlns:p="http://schemas.openxmlformats.org/presentationml/2006/main">
+  <p:cSld>
+    <p:spTree>
+      <p:nvGrpSpPr>
+        <p:cNvPr id="1" name=""/>
+        <p:cNvGrpSpPr/>
+        <p:nvPr/>
+      </p:nvGrpSpPr>
+      <p:grpSpPr>
+        <a:xfrm>
+          <a:off x="0" y="0"/>
+          <a:ext cx="0" cy="0"/>
+          <a:chOff x="0" y="0"/>
+          <a:chExt cx="0" cy="0"/>
+        </a:xfrm>
+      </p:grpSpPr>
+      <p:sp>
+        <p:nvSpPr>
+          <p:cNvPr id="2" name="1 Marcador de texto"/>
+          <p:cNvSpPr>
+            <a:spLocks noGrp="1"/>
+          </p:cNvSpPr>
+          <p:nvPr>
+            <p:ph type="body" idx="1"/>
+          </p:nvPr>
+        </p:nvSpPr>
+        <p:spPr/>
+        <p:txBody>
+          <a:bodyPr/>
+          <a:lstStyle/>
+          <a:p>
+            <a:pPr marL="566738" indent="-457200">
+              <a:buFont typeface="Trebuchet MS" pitchFamily="34" charset="0"/>
+              <a:buAutoNum type="arabicPeriod"/>
+            </a:pPr>
+            <a:endParaRPr lang="es-ES" dirty="0" smtClean="0">
+              <a:solidFill>
+                <a:schemeClr val="tx1"/>
+              </a:solidFill>
+              <a:cs typeface="Arial" charset="0"/>
+            </a:endParaRPr>
+          </a:p>
+          <a:p>
+            <a:pPr marL="566738" indent="-457200">
+              <a:buFont typeface="Trebuchet MS" pitchFamily="34" charset="0"/>
+              <a:buAutoNum type="arabicPeriod"/>
+            </a:pPr>
+            <a:endParaRPr lang="es-ES" dirty="0">
+              <a:solidFill>
+                <a:schemeClr val="tx1"/>
+              </a:solidFill>
+              <a:cs typeface="Arial" charset="0"/>
+            </a:endParaRPr>
+          </a:p>
+          <a:p>
+            <a:pPr marL="566738" indent="-457200">
+              <a:buFont typeface="Trebuchet MS" pitchFamily="34" charset="0"/>
+              <a:buAutoNum type="arabicPeriod"/>
+            </a:pPr>
+            <a:r>
+              <a:rPr lang="es-ES" sz="2600" dirty="0" smtClean="0">
+                <a:solidFill>
+                  <a:schemeClr val="tx1"/>
+                </a:solidFill>
+                <a:cs typeface="Arial" charset="0"/>
+              </a:rPr>
+              <a:t>¿</a:t>
+            </a:r>
+            <a:r>
+              <a:rPr lang="es-ES" sz="2600" dirty="0">
+                <a:solidFill>
+                  <a:schemeClr val="tx1"/>
+                </a:solidFill>
+                <a:cs typeface="Arial" charset="0"/>
+              </a:rPr>
+              <a:t>Quienes Somos? </a:t>
+            </a:r>
+          </a:p>
+          <a:p>
+            <a:pPr marL="566738" indent="-457200">
+              <a:buFont typeface="Trebuchet MS" pitchFamily="34" charset="0"/>
+              <a:buAutoNum type="arabicPeriod"/>
+            </a:pPr>
+            <a:r>
+              <a:rPr lang="es-ES" sz="2600" b="1" dirty="0">
+                <a:solidFill>
+                  <a:srgbClr val="FF0000"/>
+                </a:solidFill>
+                <a:cs typeface="Arial" charset="0"/>
+              </a:rPr>
+              <a:t>Metodología de trabajo</a:t>
+            </a:r>
+          </a:p>
+          <a:p>
+            <a:pPr marL="566738" indent="-457200">
+              <a:buFont typeface="Trebuchet MS" pitchFamily="34" charset="0"/>
+              <a:buAutoNum type="arabicPeriod"/>
+            </a:pPr>
+            <a:r>
+              <a:rPr lang="es-ES" sz="2600" dirty="0" smtClean="0">
+                <a:solidFill>
+                  <a:schemeClr val="tx1"/>
+                </a:solidFill>
+                <a:cs typeface="Arial" charset="0"/>
+              </a:rPr>
+              <a:t>Nuestro cliente</a:t>
+            </a:r>
+            <a:endParaRPr lang="es-ES" sz="2600" dirty="0">
+              <a:solidFill>
+                <a:schemeClr val="tx1"/>
+              </a:solidFill>
+              <a:cs typeface="Arial" charset="0"/>
+            </a:endParaRPr>
+          </a:p>
+          <a:p>
+            <a:pPr marL="566738" indent="-457200">
+              <a:buFont typeface="Trebuchet MS" pitchFamily="34" charset="0"/>
+              <a:buAutoNum type="arabicPeriod"/>
+            </a:pPr>
+            <a:r>
+              <a:rPr lang="es-ES" sz="2600" dirty="0">
+                <a:solidFill>
+                  <a:schemeClr val="tx1"/>
+                </a:solidFill>
+                <a:cs typeface="Arial" charset="0"/>
+              </a:rPr>
+              <a:t>Nuestra solución</a:t>
+            </a:r>
+          </a:p>
+          <a:p>
+            <a:pPr marL="566738" indent="-457200">
+              <a:buFont typeface="Trebuchet MS" pitchFamily="34" charset="0"/>
+              <a:buAutoNum type="arabicPeriod"/>
+            </a:pPr>
+            <a:r>
+              <a:rPr lang="es-ES" sz="2600" dirty="0">
+                <a:solidFill>
+                  <a:schemeClr val="tx1"/>
+                </a:solidFill>
+                <a:cs typeface="Arial" charset="0"/>
+              </a:rPr>
+              <a:t>P</a:t>
+            </a:r>
+            <a:r>
+              <a:rPr lang="es-ES" sz="2600" dirty="0" smtClean="0">
+                <a:solidFill>
+                  <a:schemeClr val="tx1"/>
+                </a:solidFill>
+                <a:cs typeface="Arial" charset="0"/>
+              </a:rPr>
+              <a:t>royecto </a:t>
+            </a:r>
+            <a:r>
+              <a:rPr lang="es-ES" sz="2600" dirty="0">
+                <a:solidFill>
+                  <a:schemeClr val="tx1"/>
+                </a:solidFill>
+                <a:cs typeface="Arial" charset="0"/>
+              </a:rPr>
+              <a:t>- Logros/Próximos pasos</a:t>
+            </a:r>
+          </a:p>
+          <a:p>
+            <a:pPr marL="566738" indent="-457200">
+              <a:buFont typeface="Trebuchet MS" pitchFamily="34" charset="0"/>
+              <a:buAutoNum type="arabicPeriod"/>
+            </a:pPr>
+            <a:r>
+              <a:rPr lang="es-ES" sz="2600" dirty="0" smtClean="0">
+                <a:solidFill>
+                  <a:schemeClr val="tx1"/>
+                </a:solidFill>
+                <a:cs typeface="Arial" charset="0"/>
+              </a:rPr>
+              <a:t>Lecciones aprendidas</a:t>
+            </a:r>
+            <a:endParaRPr lang="es-ES" sz="2600" dirty="0">
+              <a:solidFill>
+                <a:schemeClr val="tx1"/>
+              </a:solidFill>
+              <a:cs typeface="Arial" charset="0"/>
+            </a:endParaRPr>
+          </a:p>
+          <a:p>
+            <a:endParaRPr lang="es-AR" dirty="0"/>
+          </a:p>
+        </p:txBody>
+      </p:sp>
+      <p:sp>
+        <p:nvSpPr>
+          <p:cNvPr id="3" name="2 Título"/>
+          <p:cNvSpPr>
+            <a:spLocks noGrp="1"/>
+          </p:cNvSpPr>
+          <p:nvPr>
+            <p:ph type="title"/>
+          </p:nvPr>
+        </p:nvSpPr>
+        <p:spPr>
+          <a:xfrm>
+            <a:off x="457200" y="359465"/>
+            <a:ext cx="4186808" cy="1143000"/>
+          </a:xfrm>
+        </p:spPr>
+        <p:txBody>
+          <a:bodyPr/>
+          <a:lstStyle/>
+          <a:p>
+            <a:r>
+              <a:rPr lang="en-US" b="1" dirty="0"/>
+              <a:t>Agenda:</a:t>
+            </a:r>
+            <a:endParaRPr lang="es-AR" dirty="0"/>
+          </a:p>
+        </p:txBody>
+      </p:sp>
+      <p:pic>
+        <p:nvPicPr>
+          <p:cNvPr id="4" name="3 Imagen"/>
+          <p:cNvPicPr>
+            <a:picLocks noChangeAspect="1"/>
+          </p:cNvPicPr>
+          <p:nvPr/>
+        </p:nvPicPr>
+        <p:blipFill>
+          <a:blip r:embed="rId2">
+            <a:extLst>
+              <a:ext uri="{28A0092B-C50C-407E-A947-70E740481C1C}">
+                <a14:useLocalDpi xmlns:a14="http://schemas.microsoft.com/office/drawing/2010/main" val="0"/>
+              </a:ext>
+            </a:extLst>
+          </a:blip>
+          <a:stretch>
+            <a:fillRect/>
+          </a:stretch>
+        </p:blipFill>
+        <p:spPr>
+          <a:xfrm>
+            <a:off x="4572000" y="0"/>
+            <a:ext cx="4572000" cy="1340768"/>
+          </a:xfrm>
+          <a:prstGeom prst="rect">
+            <a:avLst/>
+          </a:prstGeom>
+        </p:spPr>
+      </p:pic>
+    </p:spTree>
+    <p:extLst>
+      <p:ext uri="{BB962C8B-B14F-4D97-AF65-F5344CB8AC3E}">
+        <p14:creationId xmlns:p14="http://schemas.microsoft.com/office/powerpoint/2010/main" val="4054692301"/>
+      </p:ext>
+    </p:extLst>
+  </p:cSld>
+  <p:clrMapOvr>
+    <a:masterClrMapping/>
+  </p:clrMapOvr>
+  <p:timing>
+    <p:tnLst>
+      <p:par>
+        <p:cTn id="1" dur="indefinite" restart="never" nodeType="tmRoot"/>
+      </p:par>
+    </p:tnLst>
+  </p:timing>
+</p:sld>
+</file>
+
+<file path=ppt/slides/slide8.xml><?xml version="1.0" encoding="utf-8"?>
+<p:sld xmlns:a="http://schemas.openxmlformats.org/drawingml/2006/main" xmlns:r="http://schemas.openxmlformats.org/officeDocument/2006/relationships" xmlns:p="http://schemas.openxmlformats.org/presentationml/2006/main">
+  <p:cSld>
+    <p:spTree>
+      <p:nvGrpSpPr>
+        <p:cNvPr id="1" name=""/>
+        <p:cNvGrpSpPr/>
+        <p:nvPr/>
+      </p:nvGrpSpPr>
+      <p:grpSpPr>
+        <a:xfrm>
+          <a:off x="0" y="0"/>
+          <a:ext cx="0" cy="0"/>
+          <a:chOff x="0" y="0"/>
+          <a:chExt cx="0" cy="0"/>
+        </a:xfrm>
+      </p:grpSpPr>
+      <p:sp>
+        <p:nvSpPr>
+          <p:cNvPr id="2" name="1 Marcador de texto"/>
+          <p:cNvSpPr>
+            <a:spLocks noGrp="1"/>
+          </p:cNvSpPr>
+          <p:nvPr>
+            <p:ph type="body" idx="1"/>
+          </p:nvPr>
+        </p:nvSpPr>
+        <p:spPr/>
+        <p:txBody>
+          <a:bodyPr>
+            <a:normAutofit/>
+          </a:bodyPr>
+          <a:lstStyle/>
+          <a:p>
+            <a:pPr marL="0" indent="0" algn="l">
+              <a:buNone/>
+            </a:pPr>
+            <a:endParaRPr lang="es-AR" sz="2000" dirty="0" smtClean="0">
+              <a:latin typeface="Corbel (Cuerpo)"/>
+            </a:endParaRPr>
+          </a:p>
+          <a:p>
+            <a:pPr marL="0" indent="0" algn="l">
+              <a:buNone/>
+            </a:pPr>
+            <a:r>
+              <a:rPr lang="es-AR" sz="2000" dirty="0" smtClean="0">
+                <a:latin typeface="Corbel (Cuerpo)"/>
+              </a:rPr>
+              <a:t>Nuestros </a:t>
+            </a:r>
+            <a:r>
+              <a:rPr lang="es-AR" sz="2000" dirty="0">
+                <a:latin typeface="Corbel (Cuerpo)"/>
+              </a:rPr>
+              <a:t>proyectos adoptan un marco de desarrollo acorde a la </a:t>
+            </a:r>
+          </a:p>
+          <a:p>
+            <a:pPr marL="0" indent="0" algn="l">
+              <a:buNone/>
+            </a:pPr>
+            <a:r>
+              <a:rPr lang="es-AR" sz="2000" dirty="0">
+                <a:latin typeface="Corbel (Cuerpo)"/>
+              </a:rPr>
+              <a:t>metodología del </a:t>
+            </a:r>
+            <a:r>
+              <a:rPr lang="es-AR" sz="2000" b="1" dirty="0">
+                <a:latin typeface="Corbel (Cuerpo)"/>
+              </a:rPr>
+              <a:t>Proceso Unificado</a:t>
+            </a:r>
+            <a:r>
+              <a:rPr lang="es-AR" sz="2000" dirty="0">
+                <a:latin typeface="Corbel (Cuerpo)"/>
+              </a:rPr>
+              <a:t>.</a:t>
+            </a:r>
+          </a:p>
+          <a:p>
+            <a:pPr marL="0" indent="0" algn="l">
+              <a:buNone/>
+            </a:pPr>
+            <a:endParaRPr lang="en-US" sz="1800" dirty="0" smtClean="0">
+              <a:latin typeface="Corbel (Cuerpo)"/>
+            </a:endParaRPr>
+          </a:p>
+          <a:p>
+            <a:pPr marL="0" indent="0" algn="l">
+              <a:buNone/>
+            </a:pPr>
+            <a:endParaRPr lang="en-US" sz="1800" dirty="0" smtClean="0">
+              <a:latin typeface="Corbel (Cuerpo)"/>
+            </a:endParaRPr>
+          </a:p>
+          <a:p>
+            <a:pPr algn="l"/>
+            <a:r>
+              <a:rPr lang="en-US" sz="1800" dirty="0" err="1" smtClean="0">
+                <a:latin typeface="Corbel (Cuerpo)"/>
+              </a:rPr>
+              <a:t>Iterativo</a:t>
+            </a:r>
+            <a:r>
+              <a:rPr lang="en-US" sz="1800" dirty="0" smtClean="0">
+                <a:latin typeface="Corbel (Cuerpo)"/>
+              </a:rPr>
+              <a:t> incremental</a:t>
+            </a:r>
+          </a:p>
+          <a:p>
+            <a:pPr algn="l"/>
+            <a:r>
+              <a:rPr lang="en-US" sz="1800" dirty="0" err="1" smtClean="0">
+                <a:latin typeface="Corbel (Cuerpo)"/>
+              </a:rPr>
+              <a:t>Centrado</a:t>
+            </a:r>
+            <a:r>
+              <a:rPr lang="en-US" sz="1800" dirty="0" smtClean="0">
+                <a:latin typeface="Corbel (Cuerpo)"/>
+              </a:rPr>
+              <a:t> en la </a:t>
+            </a:r>
+            <a:r>
+              <a:rPr lang="en-US" sz="1800" dirty="0" err="1">
+                <a:latin typeface="Corbel (Cuerpo)"/>
+              </a:rPr>
+              <a:t>A</a:t>
+            </a:r>
+            <a:r>
+              <a:rPr lang="en-US" sz="1800" dirty="0" err="1" smtClean="0">
+                <a:latin typeface="Corbel (Cuerpo)"/>
+              </a:rPr>
+              <a:t>rquitectura</a:t>
+            </a:r>
+            <a:endParaRPr lang="en-US" sz="1800" dirty="0" smtClean="0">
+              <a:latin typeface="Corbel (Cuerpo)"/>
+            </a:endParaRPr>
+          </a:p>
+          <a:p>
+            <a:pPr algn="l"/>
+            <a:r>
+              <a:rPr lang="en-US" sz="1800" dirty="0" err="1" smtClean="0">
+                <a:latin typeface="Corbel (Cuerpo)"/>
+              </a:rPr>
+              <a:t>Dirigido</a:t>
+            </a:r>
+            <a:r>
+              <a:rPr lang="en-US" sz="1800" dirty="0" smtClean="0">
+                <a:latin typeface="Corbel (Cuerpo)"/>
+              </a:rPr>
+              <a:t> </a:t>
+            </a:r>
+            <a:r>
+              <a:rPr lang="en-US" sz="1800" dirty="0" err="1" smtClean="0">
+                <a:latin typeface="Corbel (Cuerpo)"/>
+              </a:rPr>
+              <a:t>por</a:t>
+            </a:r>
+            <a:r>
+              <a:rPr lang="en-US" sz="1800" dirty="0" smtClean="0">
+                <a:latin typeface="Corbel (Cuerpo)"/>
+              </a:rPr>
+              <a:t> los </a:t>
+            </a:r>
+            <a:r>
+              <a:rPr lang="en-US" sz="1800" dirty="0" err="1">
+                <a:latin typeface="Corbel (Cuerpo)"/>
+              </a:rPr>
+              <a:t>C</a:t>
+            </a:r>
+            <a:r>
+              <a:rPr lang="en-US" sz="1800" dirty="0" err="1" smtClean="0">
+                <a:latin typeface="Corbel (Cuerpo)"/>
+              </a:rPr>
+              <a:t>asos</a:t>
+            </a:r>
+            <a:r>
+              <a:rPr lang="en-US" sz="1800" dirty="0" smtClean="0">
+                <a:latin typeface="Corbel (Cuerpo)"/>
+              </a:rPr>
+              <a:t> de </a:t>
+            </a:r>
+            <a:r>
+              <a:rPr lang="en-US" sz="1800" dirty="0" err="1">
+                <a:latin typeface="Corbel (Cuerpo)"/>
+              </a:rPr>
+              <a:t>U</a:t>
+            </a:r>
+            <a:r>
+              <a:rPr lang="en-US" sz="1800" dirty="0" err="1" smtClean="0">
+                <a:latin typeface="Corbel (Cuerpo)"/>
+              </a:rPr>
+              <a:t>so</a:t>
+            </a:r>
+            <a:endParaRPr lang="es-AR" sz="1800" dirty="0">
+              <a:latin typeface="Corbel (Cuerpo)"/>
+            </a:endParaRPr>
+          </a:p>
+          <a:p>
+            <a:pPr marL="0" indent="0">
+              <a:buNone/>
+            </a:pPr>
+            <a:endParaRPr lang="es-AR" dirty="0"/>
+          </a:p>
+          <a:p>
+            <a:endParaRPr lang="es-AR" dirty="0"/>
+          </a:p>
+        </p:txBody>
+      </p:sp>
+      <p:sp>
+        <p:nvSpPr>
+          <p:cNvPr id="3" name="2 Título"/>
+          <p:cNvSpPr>
+            <a:spLocks noGrp="1"/>
+          </p:cNvSpPr>
+          <p:nvPr>
+            <p:ph type="title"/>
+          </p:nvPr>
+        </p:nvSpPr>
+        <p:spPr>
+          <a:xfrm>
+            <a:off x="323528" y="359465"/>
+            <a:ext cx="4248472" cy="1143000"/>
+          </a:xfrm>
+        </p:spPr>
+        <p:txBody>
+          <a:bodyPr>
+            <a:normAutofit/>
+          </a:bodyPr>
+          <a:lstStyle/>
+          <a:p>
+            <a:r>
+              <a:rPr lang="es-ES" sz="3000" b="1" dirty="0">
+                <a:solidFill>
+                  <a:schemeClr val="tx1"/>
+                </a:solidFill>
+                <a:cs typeface="Arial" charset="0"/>
+              </a:rPr>
+              <a:t>Metodología de </a:t>
+            </a:r>
+            <a:r>
+              <a:rPr lang="es-ES" sz="3000" b="1" dirty="0" smtClean="0">
+                <a:solidFill>
+                  <a:schemeClr val="tx1"/>
+                </a:solidFill>
+                <a:cs typeface="Arial" charset="0"/>
+              </a:rPr>
+              <a:t>trabajo</a:t>
+            </a:r>
+            <a:endParaRPr lang="es-AR" sz="3000" dirty="0">
+              <a:solidFill>
+                <a:schemeClr val="tx1"/>
+              </a:solidFill>
+            </a:endParaRPr>
+          </a:p>
+        </p:txBody>
+      </p:sp>
+      <p:pic>
+        <p:nvPicPr>
+          <p:cNvPr id="4" name="3 Imagen"/>
+          <p:cNvPicPr>
+            <a:picLocks noChangeAspect="1"/>
+          </p:cNvPicPr>
+          <p:nvPr/>
+        </p:nvPicPr>
+        <p:blipFill>
+          <a:blip r:embed="rId2">
+            <a:extLst>
+              <a:ext uri="{28A0092B-C50C-407E-A947-70E740481C1C}">
+                <a14:useLocalDpi xmlns:a14="http://schemas.microsoft.com/office/drawing/2010/main" val="0"/>
+              </a:ext>
+            </a:extLst>
+          </a:blip>
+          <a:stretch>
+            <a:fillRect/>
+          </a:stretch>
+        </p:blipFill>
+        <p:spPr>
+          <a:xfrm>
+            <a:off x="4572000" y="0"/>
+            <a:ext cx="4572000" cy="1340768"/>
+          </a:xfrm>
+          <a:prstGeom prst="rect">
+            <a:avLst/>
+          </a:prstGeom>
+        </p:spPr>
+      </p:pic>
+      <p:pic>
+        <p:nvPicPr>
+          <p:cNvPr id="1026" name="Picture 2"/>
+          <p:cNvPicPr>
+            <a:picLocks noChangeAspect="1" noChangeArrowheads="1"/>
+          </p:cNvPicPr>
+          <p:nvPr/>
+        </p:nvPicPr>
+        <p:blipFill>
+          <a:blip r:embed="rId3">
+            <a:extLst>
+              <a:ext uri="{28A0092B-C50C-407E-A947-70E740481C1C}">
+                <a14:useLocalDpi xmlns:a14="http://schemas.microsoft.com/office/drawing/2010/main" val="0"/>
+              </a:ext>
+            </a:extLst>
+          </a:blip>
+          <a:srcRect/>
+          <a:stretch>
+            <a:fillRect/>
+          </a:stretch>
+        </p:blipFill>
+        <p:spPr bwMode="auto">
+          <a:xfrm>
+            <a:off x="4581847" y="2894037"/>
+            <a:ext cx="4238625" cy="3343275"/>
+          </a:xfrm>
+          <a:prstGeom prst="rect">
+            <a:avLst/>
+          </a:prstGeom>
+          <a:noFill/>
+          <a:ln>
+            <a:noFill/>
+          </a:ln>
+          <a:effectLst/>
+          <a:extLst>
+            <a:ext uri="{909E8E84-426E-40DD-AFC4-6F175D3DCCD1}">
+              <a14:hiddenFill xmlns:a14="http://schemas.microsoft.com/office/drawing/2010/main">
+                <a:solidFill>
+                  <a:schemeClr val="accent1"/>
+                </a:solidFill>
+              </a14:hiddenFill>
+            </a:ext>
+            <a:ext uri="{91240B29-F687-4F45-9708-019B960494DF}">
+              <a14:hiddenLine xmlns:a14="http://schemas.microsoft.com/office/drawing/2010/main" w="9525">
+                <a:solidFill>
+                  <a:schemeClr val="tx1"/>
+                </a:solidFill>
+                <a:miter lim="800000"/>
+                <a:headEnd/>
+                <a:tailEnd/>
+              </a14:hiddenLine>
+            </a:ext>
+            <a:ext uri="{AF507438-7753-43E0-B8FC-AC1667EBCBE1}">
+              <a14:hiddenEffects xmlns:a14="http://schemas.microsoft.com/office/drawing/2010/main">
+                <a:effectLst>
+                  <a:outerShdw dist="35921" dir="2700000" algn="ctr" rotWithShape="0">
+                    <a:schemeClr val="bg2"/>
+                  </a:outerShdw>
+                </a:effectLst>
+              </a14:hiddenEffects>
+            </a:ext>
+          </a:extLst>
+        </p:spPr>
+      </p:pic>
+    </p:spTree>
+    <p:extLst>
+      <p:ext uri="{BB962C8B-B14F-4D97-AF65-F5344CB8AC3E}">
+        <p14:creationId xmlns:p14="http://schemas.microsoft.com/office/powerpoint/2010/main" val="3764384333"/>
       </p:ext>
     </p:extLst>
   </p:cSld>

</xml_diff>